<commit_message>
dongguo push the presentation
</commit_message>
<xml_diff>
--- a/Project Presentation_dongguo.pptx
+++ b/Project Presentation_dongguo.pptx
@@ -10,11 +10,11 @@
     <p:sldId id="258" r:id="rId4"/>
     <p:sldId id="259" r:id="rId5"/>
     <p:sldId id="260" r:id="rId6"/>
-    <p:sldId id="261" r:id="rId7"/>
-    <p:sldId id="263" r:id="rId8"/>
-    <p:sldId id="264" r:id="rId9"/>
-    <p:sldId id="265" r:id="rId10"/>
-    <p:sldId id="266" r:id="rId11"/>
+    <p:sldId id="268" r:id="rId7"/>
+    <p:sldId id="264" r:id="rId8"/>
+    <p:sldId id="265" r:id="rId9"/>
+    <p:sldId id="266" r:id="rId10"/>
+    <p:sldId id="270" r:id="rId11"/>
     <p:sldId id="267" r:id="rId12"/>
   </p:sldIdLst>
   <p:sldSz cx="9144000" cy="6858000" type="screen4x3"/>
@@ -6338,10 +6338,811 @@
           </a:p>
         </p:txBody>
       </p:sp>
+      <p:graphicFrame>
+        <p:nvGraphicFramePr>
+          <p:cNvPr id="7" name="内容占位符 3">
+            <a:extLst>
+              <a:ext uri="{FF2B5EF4-FFF2-40B4-BE49-F238E27FC236}">
+                <a16:creationId xmlns:a16="http://schemas.microsoft.com/office/drawing/2014/main" id="{12C95FF4-413A-4AC0-9AB0-1A63DD5EB510}"/>
+              </a:ext>
+            </a:extLst>
+          </p:cNvPr>
+          <p:cNvGraphicFramePr>
+            <a:graphicFrameLocks/>
+          </p:cNvGraphicFramePr>
+          <p:nvPr>
+            <p:extLst>
+              <p:ext uri="{D42A27DB-BD31-4B8C-83A1-F6EECF244321}">
+                <p14:modId xmlns:p14="http://schemas.microsoft.com/office/powerpoint/2010/main" val="3816428469"/>
+              </p:ext>
+            </p:extLst>
+          </p:nvPr>
+        </p:nvGraphicFramePr>
+        <p:xfrm>
+          <a:off x="238225" y="833120"/>
+          <a:ext cx="8667549" cy="4414265"/>
+        </p:xfrm>
+        <a:graphic>
+          <a:graphicData uri="http://schemas.openxmlformats.org/drawingml/2006/table">
+            <a:tbl>
+              <a:tblPr>
+                <a:tableStyleId>{5C22544A-7EE6-4342-B048-85BDC9FD1C3A}</a:tableStyleId>
+              </a:tblPr>
+              <a:tblGrid>
+                <a:gridCol w="2206592">
+                  <a:extLst>
+                    <a:ext uri="{9D8B030D-6E8A-4147-A177-3AD203B41FA5}">
+                      <a16:colId xmlns:a16="http://schemas.microsoft.com/office/drawing/2014/main" val="20000"/>
+                    </a:ext>
+                  </a:extLst>
+                </a:gridCol>
+                <a:gridCol w="2396690">
+                  <a:extLst>
+                    <a:ext uri="{9D8B030D-6E8A-4147-A177-3AD203B41FA5}">
+                      <a16:colId xmlns:a16="http://schemas.microsoft.com/office/drawing/2014/main" val="20001"/>
+                    </a:ext>
+                  </a:extLst>
+                </a:gridCol>
+                <a:gridCol w="4064267">
+                  <a:extLst>
+                    <a:ext uri="{9D8B030D-6E8A-4147-A177-3AD203B41FA5}">
+                      <a16:colId xmlns:a16="http://schemas.microsoft.com/office/drawing/2014/main" val="20002"/>
+                    </a:ext>
+                  </a:extLst>
+                </a:gridCol>
+              </a:tblGrid>
+              <a:tr h="648675">
+                <a:tc>
+                  <a:txBody>
+                    <a:bodyPr/>
+                    <a:lstStyle/>
+                    <a:p>
+                      <a:pPr algn="ctr" fontAlgn="b"/>
+                      <a:r>
+                        <a:rPr lang="en-CA" sz="2400" u="none" strike="noStrike" dirty="0">
+                          <a:effectLst/>
+                        </a:rPr>
+                        <a:t>technology</a:t>
+                      </a:r>
+                      <a:endParaRPr lang="en-CA" sz="2400" b="0" i="0" u="none" strike="noStrike" dirty="0">
+                        <a:solidFill>
+                          <a:srgbClr val="000000"/>
+                        </a:solidFill>
+                        <a:effectLst/>
+                        <a:latin typeface="Calibri" panose="020F0502020204030204" pitchFamily="34" charset="0"/>
+                      </a:endParaRPr>
+                    </a:p>
+                  </a:txBody>
+                  <a:tcPr marL="12872" marR="12872" marT="12872" marB="0" anchor="b"/>
+                </a:tc>
+                <a:tc>
+                  <a:txBody>
+                    <a:bodyPr/>
+                    <a:lstStyle/>
+                    <a:p>
+                      <a:pPr algn="ctr" fontAlgn="b"/>
+                      <a:r>
+                        <a:rPr lang="en-CA" sz="2400" u="none" strike="noStrike" dirty="0">
+                          <a:effectLst/>
+                        </a:rPr>
+                        <a:t>Completeness</a:t>
+                      </a:r>
+                      <a:endParaRPr lang="en-CA" sz="2400" b="0" i="0" u="none" strike="noStrike" dirty="0">
+                        <a:solidFill>
+                          <a:srgbClr val="000000"/>
+                        </a:solidFill>
+                        <a:effectLst/>
+                        <a:latin typeface="Calibri" panose="020F0502020204030204" pitchFamily="34" charset="0"/>
+                      </a:endParaRPr>
+                    </a:p>
+                  </a:txBody>
+                  <a:tcPr marL="12872" marR="12872" marT="12872" marB="0" anchor="b"/>
+                </a:tc>
+                <a:tc>
+                  <a:txBody>
+                    <a:bodyPr/>
+                    <a:lstStyle/>
+                    <a:p>
+                      <a:pPr algn="ctr" fontAlgn="b"/>
+                      <a:r>
+                        <a:rPr lang="en-CA" sz="2400" u="none" strike="noStrike" dirty="0">
+                          <a:effectLst/>
+                        </a:rPr>
+                        <a:t>detail application</a:t>
+                      </a:r>
+                      <a:endParaRPr lang="en-CA" sz="2400" b="0" i="0" u="none" strike="noStrike" dirty="0">
+                        <a:solidFill>
+                          <a:srgbClr val="000000"/>
+                        </a:solidFill>
+                        <a:effectLst/>
+                        <a:latin typeface="Calibri" panose="020F0502020204030204" pitchFamily="34" charset="0"/>
+                      </a:endParaRPr>
+                    </a:p>
+                  </a:txBody>
+                  <a:tcPr marL="12872" marR="12872" marT="12872" marB="0" anchor="b"/>
+                </a:tc>
+                <a:extLst>
+                  <a:ext uri="{0D108BD9-81ED-4DB2-BD59-A6C34878D82A}">
+                    <a16:rowId xmlns:a16="http://schemas.microsoft.com/office/drawing/2014/main" val="10000"/>
+                  </a:ext>
+                </a:extLst>
+              </a:tr>
+              <a:tr h="264048">
+                <a:tc>
+                  <a:txBody>
+                    <a:bodyPr/>
+                    <a:lstStyle/>
+                    <a:p>
+                      <a:pPr algn="l" fontAlgn="b"/>
+                      <a:r>
+                        <a:rPr lang="en-CA" sz="1800" kern="1200" dirty="0" err="1">
+                          <a:solidFill>
+                            <a:schemeClr val="dk1"/>
+                          </a:solidFill>
+                          <a:effectLst/>
+                          <a:latin typeface="+mn-lt"/>
+                          <a:ea typeface="+mn-ea"/>
+                          <a:cs typeface="+mn-cs"/>
+                        </a:rPr>
+                        <a:t>Fileupload</a:t>
+                      </a:r>
+                      <a:r>
+                        <a:rPr lang="en-CA" sz="1800" kern="1200" dirty="0">
+                          <a:solidFill>
+                            <a:schemeClr val="dk1"/>
+                          </a:solidFill>
+                          <a:effectLst/>
+                          <a:latin typeface="+mn-lt"/>
+                          <a:ea typeface="+mn-ea"/>
+                          <a:cs typeface="+mn-cs"/>
+                        </a:rPr>
+                        <a:t> </a:t>
+                      </a:r>
+                      <a:endParaRPr lang="en-CA" sz="1800" b="0" i="0" u="none" strike="noStrike" dirty="0">
+                        <a:solidFill>
+                          <a:srgbClr val="000000"/>
+                        </a:solidFill>
+                        <a:effectLst/>
+                        <a:latin typeface="Calibri" panose="020F0502020204030204" pitchFamily="34" charset="0"/>
+                      </a:endParaRPr>
+                    </a:p>
+                  </a:txBody>
+                  <a:tcPr marL="12872" marR="12872" marT="12872" marB="0" anchor="b"/>
+                </a:tc>
+                <a:tc>
+                  <a:txBody>
+                    <a:bodyPr/>
+                    <a:lstStyle/>
+                    <a:p>
+                      <a:pPr algn="ctr" fontAlgn="b"/>
+                      <a:r>
+                        <a:rPr lang="en-CA" sz="1800" u="none" strike="noStrike" dirty="0">
+                          <a:effectLst/>
+                        </a:rPr>
+                        <a:t>100%</a:t>
+                      </a:r>
+                      <a:endParaRPr lang="en-CA" sz="1800" b="0" i="0" u="none" strike="noStrike" dirty="0">
+                        <a:solidFill>
+                          <a:srgbClr val="000000"/>
+                        </a:solidFill>
+                        <a:effectLst/>
+                        <a:latin typeface="Calibri" panose="020F0502020204030204" pitchFamily="34" charset="0"/>
+                      </a:endParaRPr>
+                    </a:p>
+                  </a:txBody>
+                  <a:tcPr marL="12872" marR="12872" marT="12872" marB="0" anchor="b"/>
+                </a:tc>
+                <a:tc>
+                  <a:txBody>
+                    <a:bodyPr/>
+                    <a:lstStyle/>
+                    <a:p>
+                      <a:pPr marL="0" algn="l" defTabSz="457200" rtl="0" eaLnBrk="1" fontAlgn="b" latinLnBrk="0" hangingPunct="1"/>
+                      <a:r>
+                        <a:rPr lang="en-CA" sz="1800" b="0" i="0" u="none" strike="noStrike" kern="1200" dirty="0">
+                          <a:solidFill>
+                            <a:srgbClr val="000000"/>
+                          </a:solidFill>
+                          <a:effectLst/>
+                          <a:latin typeface="Calibri" panose="020F0502020204030204" pitchFamily="34" charset="0"/>
+                          <a:ea typeface="+mn-ea"/>
+                          <a:cs typeface="+mn-cs"/>
+                        </a:rPr>
+                        <a:t>Upload product images</a:t>
+                      </a:r>
+                    </a:p>
+                  </a:txBody>
+                  <a:tcPr marL="12872" marR="12872" marT="12872" marB="0" anchor="b"/>
+                </a:tc>
+                <a:extLst>
+                  <a:ext uri="{0D108BD9-81ED-4DB2-BD59-A6C34878D82A}">
+                    <a16:rowId xmlns:a16="http://schemas.microsoft.com/office/drawing/2014/main" val="10001"/>
+                  </a:ext>
+                </a:extLst>
+              </a:tr>
+              <a:tr h="425077">
+                <a:tc>
+                  <a:txBody>
+                    <a:bodyPr/>
+                    <a:lstStyle/>
+                    <a:p>
+                      <a:pPr algn="l" fontAlgn="b"/>
+                      <a:r>
+                        <a:rPr lang="en-CA" sz="1800" kern="1200" dirty="0">
+                          <a:solidFill>
+                            <a:schemeClr val="dk1"/>
+                          </a:solidFill>
+                          <a:effectLst/>
+                          <a:latin typeface="+mn-lt"/>
+                          <a:ea typeface="+mn-ea"/>
+                          <a:cs typeface="+mn-cs"/>
+                        </a:rPr>
+                        <a:t>CRUD</a:t>
+                      </a:r>
+                      <a:endParaRPr lang="en-CA" sz="1800" b="0" i="0" u="none" strike="noStrike" dirty="0">
+                        <a:solidFill>
+                          <a:srgbClr val="000000"/>
+                        </a:solidFill>
+                        <a:effectLst/>
+                        <a:latin typeface="Calibri" panose="020F0502020204030204" pitchFamily="34" charset="0"/>
+                      </a:endParaRPr>
+                    </a:p>
+                  </a:txBody>
+                  <a:tcPr marL="12872" marR="12872" marT="12872" marB="0" anchor="b"/>
+                </a:tc>
+                <a:tc>
+                  <a:txBody>
+                    <a:bodyPr/>
+                    <a:lstStyle/>
+                    <a:p>
+                      <a:pPr algn="ctr" fontAlgn="b"/>
+                      <a:r>
+                        <a:rPr lang="en-CA" sz="1800" u="none" strike="noStrike" dirty="0">
+                          <a:effectLst/>
+                        </a:rPr>
+                        <a:t>100%</a:t>
+                      </a:r>
+                      <a:endParaRPr lang="en-CA" sz="1800" b="0" i="0" u="none" strike="noStrike" dirty="0">
+                        <a:solidFill>
+                          <a:srgbClr val="000000"/>
+                        </a:solidFill>
+                        <a:effectLst/>
+                        <a:latin typeface="Calibri" panose="020F0502020204030204" pitchFamily="34" charset="0"/>
+                      </a:endParaRPr>
+                    </a:p>
+                  </a:txBody>
+                  <a:tcPr marL="12872" marR="12872" marT="12872" marB="0" anchor="b"/>
+                </a:tc>
+                <a:tc>
+                  <a:txBody>
+                    <a:bodyPr/>
+                    <a:lstStyle/>
+                    <a:p>
+                      <a:pPr marL="0" algn="l" defTabSz="457200" rtl="0" eaLnBrk="1" fontAlgn="b" latinLnBrk="0" hangingPunct="1"/>
+                      <a:r>
+                        <a:rPr lang="en-CA" sz="1800" b="0" i="0" u="none" strike="noStrike" kern="1200" dirty="0">
+                          <a:solidFill>
+                            <a:srgbClr val="000000"/>
+                          </a:solidFill>
+                          <a:effectLst/>
+                          <a:latin typeface="Calibri" panose="020F0502020204030204" pitchFamily="34" charset="0"/>
+                          <a:ea typeface="+mn-ea"/>
+                          <a:cs typeface="+mn-cs"/>
+                        </a:rPr>
+                        <a:t>List, add books </a:t>
+                      </a:r>
+                    </a:p>
+                    <a:p>
+                      <a:pPr marL="0" algn="l" defTabSz="457200" rtl="0" eaLnBrk="1" fontAlgn="b" latinLnBrk="0" hangingPunct="1"/>
+                      <a:r>
+                        <a:rPr lang="en-CA" sz="1800" b="0" i="0" u="none" strike="noStrike" kern="1200" dirty="0">
+                          <a:solidFill>
+                            <a:srgbClr val="000000"/>
+                          </a:solidFill>
+                          <a:effectLst/>
+                          <a:latin typeface="Calibri" panose="020F0502020204030204" pitchFamily="34" charset="0"/>
+                          <a:ea typeface="+mn-ea"/>
+                          <a:cs typeface="+mn-cs"/>
+                        </a:rPr>
+                        <a:t>and add books to cart</a:t>
+                      </a:r>
+                    </a:p>
+                    <a:p>
+                      <a:pPr marL="0" algn="l" defTabSz="457200" rtl="0" eaLnBrk="1" fontAlgn="b" latinLnBrk="0" hangingPunct="1"/>
+                      <a:r>
+                        <a:rPr lang="en-CA" sz="1800" b="0" i="0" u="none" strike="noStrike" kern="1200" dirty="0">
+                          <a:solidFill>
+                            <a:srgbClr val="000000"/>
+                          </a:solidFill>
+                          <a:effectLst/>
+                          <a:latin typeface="Calibri" panose="020F0502020204030204" pitchFamily="34" charset="0"/>
+                          <a:ea typeface="+mn-ea"/>
+                          <a:cs typeface="+mn-cs"/>
+                        </a:rPr>
+                        <a:t>Shows cart and transactions</a:t>
+                      </a:r>
+                    </a:p>
+                  </a:txBody>
+                  <a:tcPr marL="12872" marR="12872" marT="12872" marB="0" anchor="b"/>
+                </a:tc>
+                <a:extLst>
+                  <a:ext uri="{0D108BD9-81ED-4DB2-BD59-A6C34878D82A}">
+                    <a16:rowId xmlns:a16="http://schemas.microsoft.com/office/drawing/2014/main" val="10002"/>
+                  </a:ext>
+                </a:extLst>
+              </a:tr>
+              <a:tr h="308930">
+                <a:tc>
+                  <a:txBody>
+                    <a:bodyPr/>
+                    <a:lstStyle/>
+                    <a:p>
+                      <a:pPr algn="l" fontAlgn="b"/>
+                      <a:r>
+                        <a:rPr lang="en-CA" sz="1800" u="none" strike="noStrike">
+                          <a:effectLst/>
+                        </a:rPr>
+                        <a:t>Azure</a:t>
+                      </a:r>
+                      <a:endParaRPr lang="en-CA" sz="1800" b="0" i="0" u="none" strike="noStrike">
+                        <a:solidFill>
+                          <a:srgbClr val="000000"/>
+                        </a:solidFill>
+                        <a:effectLst/>
+                        <a:latin typeface="Calibri" panose="020F0502020204030204" pitchFamily="34" charset="0"/>
+                      </a:endParaRPr>
+                    </a:p>
+                  </a:txBody>
+                  <a:tcPr marL="12872" marR="12872" marT="12872" marB="0" anchor="b"/>
+                </a:tc>
+                <a:tc>
+                  <a:txBody>
+                    <a:bodyPr/>
+                    <a:lstStyle/>
+                    <a:p>
+                      <a:pPr algn="ctr" fontAlgn="b"/>
+                      <a:r>
+                        <a:rPr lang="en-CA" sz="1800" u="none" strike="noStrike" dirty="0">
+                          <a:effectLst/>
+                        </a:rPr>
+                        <a:t>100%</a:t>
+                      </a:r>
+                      <a:endParaRPr lang="en-CA" sz="1800" b="0" i="0" u="none" strike="noStrike" dirty="0">
+                        <a:solidFill>
+                          <a:srgbClr val="000000"/>
+                        </a:solidFill>
+                        <a:effectLst/>
+                        <a:latin typeface="Calibri" panose="020F0502020204030204" pitchFamily="34" charset="0"/>
+                      </a:endParaRPr>
+                    </a:p>
+                  </a:txBody>
+                  <a:tcPr marL="12872" marR="12872" marT="12872" marB="0" anchor="b"/>
+                </a:tc>
+                <a:tc>
+                  <a:txBody>
+                    <a:bodyPr/>
+                    <a:lstStyle/>
+                    <a:p>
+                      <a:pPr marL="0" algn="l" defTabSz="457200" rtl="0" eaLnBrk="1" fontAlgn="b" latinLnBrk="0" hangingPunct="1"/>
+                      <a:r>
+                        <a:rPr lang="en-CA" sz="1800" b="0" i="0" u="none" strike="noStrike" kern="1200" dirty="0">
+                          <a:solidFill>
+                            <a:srgbClr val="000000"/>
+                          </a:solidFill>
+                          <a:effectLst/>
+                          <a:latin typeface="Calibri" panose="020F0502020204030204" pitchFamily="34" charset="0"/>
+                          <a:ea typeface="+mn-ea"/>
+                          <a:cs typeface="+mn-cs"/>
+                        </a:rPr>
+                        <a:t>Database is placed on  Azure</a:t>
+                      </a:r>
+                    </a:p>
+                  </a:txBody>
+                  <a:tcPr marL="12872" marR="12872" marT="12872" marB="0" anchor="b"/>
+                </a:tc>
+                <a:extLst>
+                  <a:ext uri="{0D108BD9-81ED-4DB2-BD59-A6C34878D82A}">
+                    <a16:rowId xmlns:a16="http://schemas.microsoft.com/office/drawing/2014/main" val="10003"/>
+                  </a:ext>
+                </a:extLst>
+              </a:tr>
+              <a:tr h="577132">
+                <a:tc>
+                  <a:txBody>
+                    <a:bodyPr/>
+                    <a:lstStyle/>
+                    <a:p>
+                      <a:pPr algn="l" fontAlgn="b"/>
+                      <a:r>
+                        <a:rPr lang="en-CA" sz="1800" kern="1200" dirty="0">
+                          <a:solidFill>
+                            <a:schemeClr val="dk1"/>
+                          </a:solidFill>
+                          <a:effectLst/>
+                          <a:latin typeface="+mn-lt"/>
+                          <a:ea typeface="+mn-ea"/>
+                          <a:cs typeface="+mn-cs"/>
+                        </a:rPr>
+                        <a:t>Pagination</a:t>
+                      </a:r>
+                      <a:endParaRPr lang="en-CA" sz="1800" b="0" i="0" u="none" strike="noStrike" dirty="0">
+                        <a:solidFill>
+                          <a:srgbClr val="000000"/>
+                        </a:solidFill>
+                        <a:effectLst/>
+                        <a:latin typeface="Calibri" panose="020F0502020204030204" pitchFamily="34" charset="0"/>
+                      </a:endParaRPr>
+                    </a:p>
+                  </a:txBody>
+                  <a:tcPr marL="12872" marR="12872" marT="12872" marB="0" anchor="b"/>
+                </a:tc>
+                <a:tc>
+                  <a:txBody>
+                    <a:bodyPr/>
+                    <a:lstStyle/>
+                    <a:p>
+                      <a:pPr algn="ctr" fontAlgn="b"/>
+                      <a:r>
+                        <a:rPr lang="en-CA" sz="1800" u="none" strike="noStrike" dirty="0">
+                          <a:effectLst/>
+                        </a:rPr>
+                        <a:t>100%</a:t>
+                      </a:r>
+                      <a:endParaRPr lang="en-CA" sz="1800" b="0" i="0" u="none" strike="noStrike" dirty="0">
+                        <a:solidFill>
+                          <a:srgbClr val="000000"/>
+                        </a:solidFill>
+                        <a:effectLst/>
+                        <a:latin typeface="Calibri" panose="020F0502020204030204" pitchFamily="34" charset="0"/>
+                      </a:endParaRPr>
+                    </a:p>
+                  </a:txBody>
+                  <a:tcPr marL="12872" marR="12872" marT="12872" marB="0" anchor="b"/>
+                </a:tc>
+                <a:tc>
+                  <a:txBody>
+                    <a:bodyPr/>
+                    <a:lstStyle/>
+                    <a:p>
+                      <a:pPr marL="0" algn="l" defTabSz="457200" rtl="0" eaLnBrk="1" fontAlgn="b" latinLnBrk="0" hangingPunct="1"/>
+                      <a:r>
+                        <a:rPr lang="en-CA" sz="1800" b="0" i="0" u="none" strike="noStrike" kern="1200" dirty="0">
+                          <a:solidFill>
+                            <a:srgbClr val="000000"/>
+                          </a:solidFill>
+                          <a:effectLst/>
+                          <a:latin typeface="Calibri" panose="020F0502020204030204" pitchFamily="34" charset="0"/>
+                          <a:ea typeface="+mn-ea"/>
+                          <a:cs typeface="+mn-cs"/>
+                        </a:rPr>
+                        <a:t>List boos based on page and category</a:t>
+                      </a:r>
+                    </a:p>
+                  </a:txBody>
+                  <a:tcPr marL="12872" marR="12872" marT="12872" marB="0" anchor="b"/>
+                </a:tc>
+                <a:extLst>
+                  <a:ext uri="{0D108BD9-81ED-4DB2-BD59-A6C34878D82A}">
+                    <a16:rowId xmlns:a16="http://schemas.microsoft.com/office/drawing/2014/main" val="10004"/>
+                  </a:ext>
+                </a:extLst>
+              </a:tr>
+              <a:tr h="577132">
+                <a:tc>
+                  <a:txBody>
+                    <a:bodyPr/>
+                    <a:lstStyle/>
+                    <a:p>
+                      <a:pPr algn="l" fontAlgn="b"/>
+                      <a:r>
+                        <a:rPr lang="en-CA" sz="1800" kern="1200" dirty="0">
+                          <a:solidFill>
+                            <a:schemeClr val="dk1"/>
+                          </a:solidFill>
+                          <a:effectLst/>
+                          <a:latin typeface="+mn-lt"/>
+                          <a:ea typeface="+mn-ea"/>
+                          <a:cs typeface="+mn-cs"/>
+                        </a:rPr>
+                        <a:t>AJAX</a:t>
+                      </a:r>
+                      <a:endParaRPr lang="en-CA" sz="1800" b="0" i="0" u="none" strike="noStrike" dirty="0">
+                        <a:solidFill>
+                          <a:srgbClr val="000000"/>
+                        </a:solidFill>
+                        <a:effectLst/>
+                        <a:latin typeface="Calibri" panose="020F0502020204030204" pitchFamily="34" charset="0"/>
+                      </a:endParaRPr>
+                    </a:p>
+                  </a:txBody>
+                  <a:tcPr marL="12872" marR="12872" marT="12872" marB="0" anchor="b"/>
+                </a:tc>
+                <a:tc>
+                  <a:txBody>
+                    <a:bodyPr/>
+                    <a:lstStyle/>
+                    <a:p>
+                      <a:pPr algn="ctr" fontAlgn="b"/>
+                      <a:r>
+                        <a:rPr lang="en-CA" sz="1800" u="none" strike="noStrike" dirty="0">
+                          <a:effectLst/>
+                        </a:rPr>
+                        <a:t>100%</a:t>
+                      </a:r>
+                      <a:endParaRPr lang="en-CA" sz="1800" b="0" i="0" u="none" strike="noStrike" dirty="0">
+                        <a:solidFill>
+                          <a:srgbClr val="000000"/>
+                        </a:solidFill>
+                        <a:effectLst/>
+                        <a:latin typeface="Calibri" panose="020F0502020204030204" pitchFamily="34" charset="0"/>
+                      </a:endParaRPr>
+                    </a:p>
+                  </a:txBody>
+                  <a:tcPr marL="12872" marR="12872" marT="12872" marB="0" anchor="b"/>
+                </a:tc>
+                <a:tc>
+                  <a:txBody>
+                    <a:bodyPr/>
+                    <a:lstStyle/>
+                    <a:p>
+                      <a:pPr marL="0" algn="l" defTabSz="457200" rtl="0" eaLnBrk="1" fontAlgn="b" latinLnBrk="0" hangingPunct="1"/>
+                      <a:r>
+                        <a:rPr lang="en-CA" sz="1800" b="0" i="0" u="none" strike="noStrike" kern="1200" dirty="0">
+                          <a:solidFill>
+                            <a:srgbClr val="000000"/>
+                          </a:solidFill>
+                          <a:effectLst/>
+                          <a:latin typeface="Calibri" panose="020F0502020204030204" pitchFamily="34" charset="0"/>
+                          <a:ea typeface="+mn-ea"/>
+                          <a:cs typeface="+mn-cs"/>
+                        </a:rPr>
+                        <a:t>Show the books </a:t>
+                      </a:r>
+                      <a:r>
+                        <a:rPr lang="en-CA" sz="1800" b="0" i="0" u="none" strike="noStrike" kern="1200" dirty="0" err="1">
+                          <a:solidFill>
+                            <a:srgbClr val="000000"/>
+                          </a:solidFill>
+                          <a:effectLst/>
+                          <a:latin typeface="Calibri" panose="020F0502020204030204" pitchFamily="34" charset="0"/>
+                          <a:ea typeface="+mn-ea"/>
+                          <a:cs typeface="+mn-cs"/>
+                        </a:rPr>
+                        <a:t>categoris</a:t>
+                      </a:r>
+                      <a:r>
+                        <a:rPr lang="en-CA" sz="1800" b="0" i="0" u="none" strike="noStrike" kern="1200" dirty="0">
+                          <a:solidFill>
+                            <a:srgbClr val="000000"/>
+                          </a:solidFill>
+                          <a:effectLst/>
+                          <a:latin typeface="Calibri" panose="020F0502020204030204" pitchFamily="34" charset="0"/>
+                          <a:ea typeface="+mn-ea"/>
+                          <a:cs typeface="+mn-cs"/>
+                        </a:rPr>
+                        <a:t> when add book</a:t>
+                      </a:r>
+                    </a:p>
+                  </a:txBody>
+                  <a:tcPr marL="12872" marR="12872" marT="12872" marB="0" anchor="b"/>
+                </a:tc>
+                <a:extLst>
+                  <a:ext uri="{0D108BD9-81ED-4DB2-BD59-A6C34878D82A}">
+                    <a16:rowId xmlns:a16="http://schemas.microsoft.com/office/drawing/2014/main" val="10005"/>
+                  </a:ext>
+                </a:extLst>
+              </a:tr>
+              <a:tr h="308930">
+                <a:tc>
+                  <a:txBody>
+                    <a:bodyPr/>
+                    <a:lstStyle/>
+                    <a:p>
+                      <a:pPr lvl="0"/>
+                      <a:r>
+                        <a:rPr lang="en-CA" sz="1800" kern="1200" dirty="0">
+                          <a:solidFill>
+                            <a:schemeClr val="dk1"/>
+                          </a:solidFill>
+                          <a:effectLst/>
+                          <a:latin typeface="+mn-lt"/>
+                          <a:ea typeface="+mn-ea"/>
+                          <a:cs typeface="+mn-cs"/>
+                        </a:rPr>
+                        <a:t>PHP Md5 Password Decode</a:t>
+                      </a:r>
+                      <a:endParaRPr lang="en-US" sz="1800" kern="1200" dirty="0">
+                        <a:solidFill>
+                          <a:schemeClr val="dk1"/>
+                        </a:solidFill>
+                        <a:effectLst/>
+                        <a:latin typeface="+mn-lt"/>
+                        <a:ea typeface="+mn-ea"/>
+                        <a:cs typeface="+mn-cs"/>
+                      </a:endParaRPr>
+                    </a:p>
+                  </a:txBody>
+                  <a:tcPr marL="12872" marR="12872" marT="12872" marB="0" anchor="b"/>
+                </a:tc>
+                <a:tc>
+                  <a:txBody>
+                    <a:bodyPr/>
+                    <a:lstStyle/>
+                    <a:p>
+                      <a:pPr algn="ctr" fontAlgn="b"/>
+                      <a:endParaRPr lang="en-CA" sz="1800" b="0" i="0" u="none" strike="noStrike" dirty="0">
+                        <a:solidFill>
+                          <a:srgbClr val="000000"/>
+                        </a:solidFill>
+                        <a:effectLst/>
+                        <a:latin typeface="Calibri" panose="020F0502020204030204" pitchFamily="34" charset="0"/>
+                      </a:endParaRPr>
+                    </a:p>
+                  </a:txBody>
+                  <a:tcPr marL="12872" marR="12872" marT="12872" marB="0" anchor="b"/>
+                </a:tc>
+                <a:tc>
+                  <a:txBody>
+                    <a:bodyPr/>
+                    <a:lstStyle/>
+                    <a:p>
+                      <a:pPr marL="0" algn="l" defTabSz="457200" rtl="0" eaLnBrk="1" fontAlgn="b" latinLnBrk="0" hangingPunct="1"/>
+                      <a:endParaRPr lang="en-CA" sz="1800" b="0" i="0" u="none" strike="noStrike" kern="1200" dirty="0">
+                        <a:solidFill>
+                          <a:srgbClr val="000000"/>
+                        </a:solidFill>
+                        <a:effectLst/>
+                        <a:latin typeface="Calibri" panose="020F0502020204030204" pitchFamily="34" charset="0"/>
+                        <a:ea typeface="+mn-ea"/>
+                        <a:cs typeface="+mn-cs"/>
+                      </a:endParaRPr>
+                    </a:p>
+                  </a:txBody>
+                  <a:tcPr marL="12872" marR="12872" marT="12872" marB="0" anchor="b"/>
+                </a:tc>
+                <a:extLst>
+                  <a:ext uri="{0D108BD9-81ED-4DB2-BD59-A6C34878D82A}">
+                    <a16:rowId xmlns:a16="http://schemas.microsoft.com/office/drawing/2014/main" val="10006"/>
+                  </a:ext>
+                </a:extLst>
+              </a:tr>
+              <a:tr h="308930">
+                <a:tc>
+                  <a:txBody>
+                    <a:bodyPr/>
+                    <a:lstStyle/>
+                    <a:p>
+                      <a:pPr algn="l" fontAlgn="b"/>
+                      <a:r>
+                        <a:rPr lang="en-CA" sz="1800" b="0" i="0" u="none" strike="noStrike" dirty="0">
+                          <a:solidFill>
+                            <a:srgbClr val="000000"/>
+                          </a:solidFill>
+                          <a:effectLst/>
+                          <a:latin typeface="Calibri" panose="020F0502020204030204" pitchFamily="34" charset="0"/>
+                        </a:rPr>
+                        <a:t>AJAX</a:t>
+                      </a:r>
+                    </a:p>
+                  </a:txBody>
+                  <a:tcPr marL="12872" marR="12872" marT="12872" marB="0" anchor="b"/>
+                </a:tc>
+                <a:tc>
+                  <a:txBody>
+                    <a:bodyPr/>
+                    <a:lstStyle/>
+                    <a:p>
+                      <a:pPr algn="ctr" fontAlgn="b"/>
+                      <a:r>
+                        <a:rPr lang="en-CA" sz="1800" b="0" i="0" u="none" strike="noStrike" dirty="0">
+                          <a:solidFill>
+                            <a:srgbClr val="000000"/>
+                          </a:solidFill>
+                          <a:effectLst/>
+                          <a:latin typeface="Calibri" panose="020F0502020204030204" pitchFamily="34" charset="0"/>
+                        </a:rPr>
+                        <a:t>future</a:t>
+                      </a:r>
+                    </a:p>
+                  </a:txBody>
+                  <a:tcPr marL="12872" marR="12872" marT="12872" marB="0" anchor="b"/>
+                </a:tc>
+                <a:tc>
+                  <a:txBody>
+                    <a:bodyPr/>
+                    <a:lstStyle/>
+                    <a:p>
+                      <a:pPr marL="0" algn="l" defTabSz="457200" rtl="0" eaLnBrk="1" fontAlgn="b" latinLnBrk="0" hangingPunct="1"/>
+                      <a:r>
+                        <a:rPr lang="en-CA" sz="1800" b="0" i="0" u="none" strike="noStrike" kern="1200" dirty="0">
+                          <a:solidFill>
+                            <a:srgbClr val="000000"/>
+                          </a:solidFill>
+                          <a:effectLst/>
+                          <a:latin typeface="Calibri" panose="020F0502020204030204" pitchFamily="34" charset="0"/>
+                          <a:ea typeface="+mn-ea"/>
+                          <a:cs typeface="+mn-cs"/>
+                        </a:rPr>
+                        <a:t>Display the books list</a:t>
+                      </a:r>
+                    </a:p>
+                  </a:txBody>
+                  <a:tcPr marL="12872" marR="12872" marT="12872" marB="0" anchor="b"/>
+                </a:tc>
+                <a:extLst>
+                  <a:ext uri="{0D108BD9-81ED-4DB2-BD59-A6C34878D82A}">
+                    <a16:rowId xmlns:a16="http://schemas.microsoft.com/office/drawing/2014/main" val="10007"/>
+                  </a:ext>
+                </a:extLst>
+              </a:tr>
+              <a:tr h="308930">
+                <a:tc>
+                  <a:txBody>
+                    <a:bodyPr/>
+                    <a:lstStyle/>
+                    <a:p>
+                      <a:pPr algn="l" fontAlgn="b"/>
+                      <a:endParaRPr lang="en-CA" sz="1800" b="0" i="0" u="none" strike="noStrike" dirty="0">
+                        <a:solidFill>
+                          <a:srgbClr val="000000"/>
+                        </a:solidFill>
+                        <a:effectLst/>
+                        <a:latin typeface="Calibri" panose="020F0502020204030204" pitchFamily="34" charset="0"/>
+                      </a:endParaRPr>
+                    </a:p>
+                  </a:txBody>
+                  <a:tcPr marL="12872" marR="12872" marT="12872" marB="0" anchor="b"/>
+                </a:tc>
+                <a:tc>
+                  <a:txBody>
+                    <a:bodyPr/>
+                    <a:lstStyle/>
+                    <a:p>
+                      <a:pPr algn="ctr" fontAlgn="b"/>
+                      <a:endParaRPr lang="en-CA" sz="1800" b="0" i="0" u="none" strike="noStrike" dirty="0">
+                        <a:solidFill>
+                          <a:srgbClr val="000000"/>
+                        </a:solidFill>
+                        <a:effectLst/>
+                        <a:latin typeface="Calibri" panose="020F0502020204030204" pitchFamily="34" charset="0"/>
+                      </a:endParaRPr>
+                    </a:p>
+                  </a:txBody>
+                  <a:tcPr marL="12872" marR="12872" marT="12872" marB="0" anchor="b"/>
+                </a:tc>
+                <a:tc>
+                  <a:txBody>
+                    <a:bodyPr/>
+                    <a:lstStyle/>
+                    <a:p>
+                      <a:pPr marL="0" algn="l" defTabSz="457200" rtl="0" eaLnBrk="1" fontAlgn="b" latinLnBrk="0" hangingPunct="1"/>
+                      <a:endParaRPr lang="en-CA" sz="1800" b="0" i="0" u="none" strike="noStrike" kern="1200" dirty="0">
+                        <a:solidFill>
+                          <a:srgbClr val="000000"/>
+                        </a:solidFill>
+                        <a:effectLst/>
+                        <a:latin typeface="Calibri" panose="020F0502020204030204" pitchFamily="34" charset="0"/>
+                        <a:ea typeface="+mn-ea"/>
+                        <a:cs typeface="+mn-cs"/>
+                      </a:endParaRPr>
+                    </a:p>
+                  </a:txBody>
+                  <a:tcPr marL="12872" marR="12872" marT="12872" marB="0" anchor="b"/>
+                </a:tc>
+                <a:extLst>
+                  <a:ext uri="{0D108BD9-81ED-4DB2-BD59-A6C34878D82A}">
+                    <a16:rowId xmlns:a16="http://schemas.microsoft.com/office/drawing/2014/main" val="10008"/>
+                  </a:ext>
+                </a:extLst>
+              </a:tr>
+            </a:tbl>
+          </a:graphicData>
+        </a:graphic>
+      </p:graphicFrame>
     </p:spTree>
     <p:extLst>
       <p:ext uri="{BB962C8B-B14F-4D97-AF65-F5344CB8AC3E}">
-        <p14:creationId xmlns:p14="http://schemas.microsoft.com/office/powerpoint/2010/main" val="2413118517"/>
+        <p14:creationId xmlns:p14="http://schemas.microsoft.com/office/powerpoint/2010/main" val="2368479760"/>
       </p:ext>
     </p:extLst>
   </p:cSld>
@@ -6739,25 +7540,6 @@
       </p:sp>
       <p:sp>
         <p:nvSpPr>
-          <p:cNvPr id="5" name="Content Placeholder 4"/>
-          <p:cNvSpPr>
-            <a:spLocks noGrp="1"/>
-          </p:cNvSpPr>
-          <p:nvPr>
-            <p:ph idx="1"/>
-          </p:nvPr>
-        </p:nvSpPr>
-        <p:spPr/>
-        <p:txBody>
-          <a:bodyPr/>
-          <a:lstStyle/>
-          <a:p>
-            <a:endParaRPr lang="en-US"/>
-          </a:p>
-        </p:txBody>
-      </p:sp>
-      <p:sp>
-        <p:nvSpPr>
           <p:cNvPr id="6" name="Text Placeholder 5"/>
           <p:cNvSpPr>
             <a:spLocks noGrp="1"/>
@@ -6797,7 +7579,7 @@
         </p:blipFill>
         <p:spPr>
           <a:xfrm>
-            <a:off x="84739" y="146050"/>
+            <a:off x="84739" y="-1547996"/>
             <a:ext cx="4487261" cy="8365536"/>
           </a:xfrm>
           <a:prstGeom prst="rect">
@@ -6807,10 +7589,10 @@
       </p:pic>
       <p:pic>
         <p:nvPicPr>
-          <p:cNvPr id="7" name="Picture 6">
+          <p:cNvPr id="3" name="Picture 2">
             <a:extLst>
               <a:ext uri="{FF2B5EF4-FFF2-40B4-BE49-F238E27FC236}">
-                <a16:creationId xmlns:a16="http://schemas.microsoft.com/office/drawing/2014/main" id="{6CBFA545-468D-4DA5-BA7D-D81CD72F87FF}"/>
+                <a16:creationId xmlns:a16="http://schemas.microsoft.com/office/drawing/2014/main" id="{71544937-BA3D-426C-A315-988EADFA5CBE}"/>
               </a:ext>
             </a:extLst>
           </p:cNvPr>
@@ -6820,15 +7602,47 @@
           <p:nvPr/>
         </p:nvPicPr>
         <p:blipFill>
-          <a:blip r:embed="rId2"/>
+          <a:blip r:embed="rId3"/>
           <a:stretch>
             <a:fillRect/>
           </a:stretch>
         </p:blipFill>
         <p:spPr>
           <a:xfrm>
-            <a:off x="4656739" y="-1621836"/>
-            <a:ext cx="4487261" cy="8365536"/>
+            <a:off x="4199605" y="3245138"/>
+            <a:ext cx="5540786" cy="2779742"/>
+          </a:xfrm>
+          <a:prstGeom prst="rect">
+            <a:avLst/>
+          </a:prstGeom>
+        </p:spPr>
+      </p:pic>
+      <p:pic>
+        <p:nvPicPr>
+          <p:cNvPr id="8" name="Content Placeholder 7">
+            <a:extLst>
+              <a:ext uri="{FF2B5EF4-FFF2-40B4-BE49-F238E27FC236}">
+                <a16:creationId xmlns:a16="http://schemas.microsoft.com/office/drawing/2014/main" id="{3ADC89D1-C57E-47DF-A957-BEFEAFD7CF5E}"/>
+              </a:ext>
+            </a:extLst>
+          </p:cNvPr>
+          <p:cNvPicPr>
+            <a:picLocks noGrp="1" noChangeAspect="1"/>
+          </p:cNvPicPr>
+          <p:nvPr>
+            <p:ph idx="1"/>
+          </p:nvPr>
+        </p:nvPicPr>
+        <p:blipFill>
+          <a:blip r:embed="rId4"/>
+          <a:stretch>
+            <a:fillRect/>
+          </a:stretch>
+        </p:blipFill>
+        <p:spPr>
+          <a:xfrm>
+            <a:off x="4199605" y="528288"/>
+            <a:ext cx="4940768" cy="2367312"/>
           </a:xfrm>
           <a:prstGeom prst="rect">
             <a:avLst/>
@@ -7018,7 +7832,7 @@
             </a:br>
             <a:r>
               <a:rPr lang="en-US" dirty="0"/>
-              <a:t>Items</a:t>
+              <a:t>Cart</a:t>
             </a:r>
           </a:p>
         </p:txBody>
@@ -7061,10 +7875,69 @@
           </a:p>
         </p:txBody>
       </p:sp>
+      <p:pic>
+        <p:nvPicPr>
+          <p:cNvPr id="3" name="Picture 2">
+            <a:extLst>
+              <a:ext uri="{FF2B5EF4-FFF2-40B4-BE49-F238E27FC236}">
+                <a16:creationId xmlns:a16="http://schemas.microsoft.com/office/drawing/2014/main" id="{B39FD2CD-0B40-407B-973B-B28C6E9BA939}"/>
+              </a:ext>
+            </a:extLst>
+          </p:cNvPr>
+          <p:cNvPicPr>
+            <a:picLocks noChangeAspect="1"/>
+          </p:cNvPicPr>
+          <p:nvPr/>
+        </p:nvPicPr>
+        <p:blipFill>
+          <a:blip r:embed="rId2"/>
+          <a:stretch>
+            <a:fillRect/>
+          </a:stretch>
+        </p:blipFill>
+        <p:spPr>
+          <a:xfrm>
+            <a:off x="742950" y="88477"/>
+            <a:ext cx="7892542" cy="6681046"/>
+          </a:xfrm>
+          <a:prstGeom prst="rect">
+            <a:avLst/>
+          </a:prstGeom>
+        </p:spPr>
+      </p:pic>
+      <p:pic>
+        <p:nvPicPr>
+          <p:cNvPr id="7" name="Picture 6">
+            <a:extLst>
+              <a:ext uri="{FF2B5EF4-FFF2-40B4-BE49-F238E27FC236}">
+                <a16:creationId xmlns:a16="http://schemas.microsoft.com/office/drawing/2014/main" id="{9B20013E-13C6-42A3-A597-1FBAAEB92A10}"/>
+              </a:ext>
+            </a:extLst>
+          </p:cNvPr>
+          <p:cNvPicPr>
+            <a:picLocks noChangeAspect="1"/>
+          </p:cNvPicPr>
+          <p:nvPr/>
+        </p:nvPicPr>
+        <p:blipFill rotWithShape="1">
+          <a:blip r:embed="rId3"/>
+          <a:srcRect b="25107"/>
+          <a:stretch/>
+        </p:blipFill>
+        <p:spPr>
+          <a:xfrm>
+            <a:off x="2042387" y="1828120"/>
+            <a:ext cx="6307863" cy="3166199"/>
+          </a:xfrm>
+          <a:prstGeom prst="rect">
+            <a:avLst/>
+          </a:prstGeom>
+        </p:spPr>
+      </p:pic>
     </p:spTree>
     <p:extLst>
       <p:ext uri="{BB962C8B-B14F-4D97-AF65-F5344CB8AC3E}">
-        <p14:creationId xmlns:p14="http://schemas.microsoft.com/office/powerpoint/2010/main" val="2319216445"/>
+        <p14:creationId xmlns:p14="http://schemas.microsoft.com/office/powerpoint/2010/main" val="1669234548"/>
       </p:ext>
     </p:extLst>
   </p:cSld>
@@ -7108,15 +7981,12 @@
           <a:p>
             <a:pPr algn="ctr"/>
             <a:r>
+              <a:rPr lang="en-US"/>
+              <a:t>Font </a:t>
+            </a:r>
+            <a:r>
               <a:rPr lang="en-US" dirty="0"/>
-              <a:t>Bootstrap:</a:t>
-            </a:r>
-            <a:br>
-              <a:rPr lang="en-US" dirty="0"/>
-            </a:br>
-            <a:r>
-              <a:rPr lang="en-US" dirty="0"/>
-              <a:t>Columniation</a:t>
+              <a:t>Awesome</a:t>
             </a:r>
           </a:p>
         </p:txBody>
@@ -7159,10 +8029,40 @@
           </a:p>
         </p:txBody>
       </p:sp>
+      <p:pic>
+        <p:nvPicPr>
+          <p:cNvPr id="3" name="Picture 2">
+            <a:extLst>
+              <a:ext uri="{FF2B5EF4-FFF2-40B4-BE49-F238E27FC236}">
+                <a16:creationId xmlns:a16="http://schemas.microsoft.com/office/drawing/2014/main" id="{182FABAE-EEBD-469C-911E-DFAF08B6E111}"/>
+              </a:ext>
+            </a:extLst>
+          </p:cNvPr>
+          <p:cNvPicPr>
+            <a:picLocks noChangeAspect="1"/>
+          </p:cNvPicPr>
+          <p:nvPr/>
+        </p:nvPicPr>
+        <p:blipFill>
+          <a:blip r:embed="rId2"/>
+          <a:stretch>
+            <a:fillRect/>
+          </a:stretch>
+        </p:blipFill>
+        <p:spPr>
+          <a:xfrm>
+            <a:off x="54843" y="228927"/>
+            <a:ext cx="9021780" cy="6371257"/>
+          </a:xfrm>
+          <a:prstGeom prst="rect">
+            <a:avLst/>
+          </a:prstGeom>
+        </p:spPr>
+      </p:pic>
     </p:spTree>
     <p:extLst>
       <p:ext uri="{BB962C8B-B14F-4D97-AF65-F5344CB8AC3E}">
-        <p14:creationId xmlns:p14="http://schemas.microsoft.com/office/powerpoint/2010/main" val="1438647864"/>
+        <p14:creationId xmlns:p14="http://schemas.microsoft.com/office/powerpoint/2010/main" val="3814727283"/>
       </p:ext>
     </p:extLst>
   </p:cSld>
@@ -7206,12 +8106,8 @@
           <a:p>
             <a:pPr algn="ctr"/>
             <a:r>
-              <a:rPr lang="en-US"/>
-              <a:t>Font </a:t>
-            </a:r>
-            <a:r>
               <a:rPr lang="en-US" dirty="0"/>
-              <a:t>Awesome</a:t>
+              <a:t>Pagination</a:t>
             </a:r>
           </a:p>
         </p:txBody>
@@ -7254,10 +8150,40 @@
           </a:p>
         </p:txBody>
       </p:sp>
+      <p:pic>
+        <p:nvPicPr>
+          <p:cNvPr id="2" name="Picture 1">
+            <a:extLst>
+              <a:ext uri="{FF2B5EF4-FFF2-40B4-BE49-F238E27FC236}">
+                <a16:creationId xmlns:a16="http://schemas.microsoft.com/office/drawing/2014/main" id="{E7BADEB9-A5F0-485D-8CCD-8C48ED976CB9}"/>
+              </a:ext>
+            </a:extLst>
+          </p:cNvPr>
+          <p:cNvPicPr>
+            <a:picLocks noChangeAspect="1"/>
+          </p:cNvPicPr>
+          <p:nvPr/>
+        </p:nvPicPr>
+        <p:blipFill>
+          <a:blip r:embed="rId2"/>
+          <a:stretch>
+            <a:fillRect/>
+          </a:stretch>
+        </p:blipFill>
+        <p:spPr>
+          <a:xfrm>
+            <a:off x="0" y="490491"/>
+            <a:ext cx="9144000" cy="5877017"/>
+          </a:xfrm>
+          <a:prstGeom prst="rect">
+            <a:avLst/>
+          </a:prstGeom>
+        </p:spPr>
+      </p:pic>
     </p:spTree>
     <p:extLst>
       <p:ext uri="{BB962C8B-B14F-4D97-AF65-F5344CB8AC3E}">
-        <p14:creationId xmlns:p14="http://schemas.microsoft.com/office/powerpoint/2010/main" val="3814727283"/>
+        <p14:creationId xmlns:p14="http://schemas.microsoft.com/office/powerpoint/2010/main" val="2413118517"/>
       </p:ext>
     </p:extLst>
   </p:cSld>
@@ -7301,9 +8227,10 @@
           <a:p>
             <a:pPr algn="ctr"/>
             <a:r>
-              <a:rPr lang="en-US" dirty="0"/>
-              <a:t>Pagination</a:t>
-            </a:r>
+              <a:rPr lang="en-US" dirty="0" err="1"/>
+              <a:t>DeweyDecimalClass</a:t>
+            </a:r>
+            <a:endParaRPr lang="en-US" dirty="0"/>
           </a:p>
         </p:txBody>
       </p:sp>
@@ -7345,6 +8272,36 @@
           </a:p>
         </p:txBody>
       </p:sp>
+      <p:pic>
+        <p:nvPicPr>
+          <p:cNvPr id="2" name="Picture 1">
+            <a:extLst>
+              <a:ext uri="{FF2B5EF4-FFF2-40B4-BE49-F238E27FC236}">
+                <a16:creationId xmlns:a16="http://schemas.microsoft.com/office/drawing/2014/main" id="{8AD1B6E0-577E-45DE-B5A6-C26BBFB9E9D7}"/>
+              </a:ext>
+            </a:extLst>
+          </p:cNvPr>
+          <p:cNvPicPr>
+            <a:picLocks noChangeAspect="1"/>
+          </p:cNvPicPr>
+          <p:nvPr/>
+        </p:nvPicPr>
+        <p:blipFill>
+          <a:blip r:embed="rId2"/>
+          <a:stretch>
+            <a:fillRect/>
+          </a:stretch>
+        </p:blipFill>
+        <p:spPr>
+          <a:xfrm>
+            <a:off x="0" y="1350481"/>
+            <a:ext cx="9144000" cy="4157037"/>
+          </a:xfrm>
+          <a:prstGeom prst="rect">
+            <a:avLst/>
+          </a:prstGeom>
+        </p:spPr>
+      </p:pic>
     </p:spTree>
     <p:extLst>
       <p:ext uri="{BB962C8B-B14F-4D97-AF65-F5344CB8AC3E}">

</xml_diff>